<commit_message>
for now, it works
</commit_message>
<xml_diff>
--- a/pptx_presentations/plots/MX_plots.pptx
+++ b/pptx_presentations/plots/MX_plots.pptx
@@ -18,9 +18,6 @@
     <p:sldId id="266" r:id="rId17"/>
     <p:sldId id="267" r:id="rId18"/>
     <p:sldId id="268" r:id="rId19"/>
-    <p:sldId id="269" r:id="rId20"/>
-    <p:sldId id="270" r:id="rId21"/>
-    <p:sldId id="271" r:id="rId22"/>
   </p:sldIdLst>
   <p:sldSz cx="13258800" cy="6858000" type="screen4x3"/>
   <p:notesSz cx="6858000" cy="9144000"/>
@@ -3208,7 +3205,7 @@
           <a:lstStyle/>
           <a:p>
             <a:r>
-              <a:rPr sz="3600" b="1">
+              <a:rPr sz="2520" b="1">
                 <a:solidFill>
                   <a:srgbClr val="000000"/>
                 </a:solidFill>
@@ -3270,7 +3267,7 @@
         <p:spPr>
           <a:xfrm>
             <a:off x="457200" y="1965960"/>
-            <a:ext cx="4114800" cy="3086100"/>
+            <a:ext cx="4114800" cy="3600450"/>
           </a:xfrm>
           <a:prstGeom prst="rect">
             <a:avLst/>
@@ -3285,8 +3282,8 @@
         </p:nvSpPr>
         <p:spPr>
           <a:xfrm>
-            <a:off x="457200" y="5326380"/>
-            <a:ext cx="4087368" cy="1348739"/>
+            <a:off x="457200" y="5840730"/>
+            <a:ext cx="4087368" cy="834389"/>
           </a:xfrm>
           <a:prstGeom prst="rect">
             <a:avLst/>
@@ -3321,7 +3318,7 @@
         </p:nvSpPr>
         <p:spPr>
           <a:xfrm>
-            <a:off x="457200" y="5052060"/>
+            <a:off x="457200" y="5566410"/>
             <a:ext cx="4087368" cy="274320"/>
           </a:xfrm>
           <a:prstGeom prst="rect">
@@ -3344,7 +3341,7 @@
                 </a:solidFill>
                 <a:latin typeface="Roboto"/>
               </a:rPr>
-              <a:t>Insights</a:t>
+              <a:t>Comments</a:t>
             </a:r>
           </a:p>
         </p:txBody>
@@ -3366,7 +3363,7 @@
         <p:spPr>
           <a:xfrm>
             <a:off x="4572000" y="1965960"/>
-            <a:ext cx="4114800" cy="3086100"/>
+            <a:ext cx="4114800" cy="3600450"/>
           </a:xfrm>
           <a:prstGeom prst="rect">
             <a:avLst/>
@@ -3381,8 +3378,8 @@
         </p:nvSpPr>
         <p:spPr>
           <a:xfrm>
-            <a:off x="4572000" y="5326380"/>
-            <a:ext cx="4087368" cy="1348739"/>
+            <a:off x="4572000" y="5840730"/>
+            <a:ext cx="4087368" cy="834389"/>
           </a:xfrm>
           <a:prstGeom prst="rect">
             <a:avLst/>
@@ -3426,7 +3423,7 @@
         <p:spPr>
           <a:xfrm>
             <a:off x="8686800" y="1965960"/>
-            <a:ext cx="4114800" cy="3086100"/>
+            <a:ext cx="4114800" cy="3600450"/>
           </a:xfrm>
           <a:prstGeom prst="rect">
             <a:avLst/>
@@ -3441,8 +3438,8 @@
         </p:nvSpPr>
         <p:spPr>
           <a:xfrm>
-            <a:off x="8686800" y="5326380"/>
-            <a:ext cx="4087368" cy="1348739"/>
+            <a:off x="8686800" y="5840730"/>
+            <a:ext cx="4087368" cy="834389"/>
           </a:xfrm>
           <a:prstGeom prst="rect">
             <a:avLst/>
@@ -3592,7 +3589,7 @@
           <a:lstStyle/>
           <a:p>
             <a:r>
-              <a:rPr sz="3600" b="1">
+              <a:rPr sz="2520" b="1">
                 <a:solidFill>
                   <a:srgbClr val="000000"/>
                 </a:solidFill>
@@ -3654,7 +3651,7 @@
         <p:spPr>
           <a:xfrm>
             <a:off x="457200" y="1965960"/>
-            <a:ext cx="4114800" cy="3086100"/>
+            <a:ext cx="4114800" cy="3600450"/>
           </a:xfrm>
           <a:prstGeom prst="rect">
             <a:avLst/>
@@ -3669,8 +3666,8 @@
         </p:nvSpPr>
         <p:spPr>
           <a:xfrm>
-            <a:off x="457200" y="5326380"/>
-            <a:ext cx="4087368" cy="1348739"/>
+            <a:off x="457200" y="5840730"/>
+            <a:ext cx="4087368" cy="834389"/>
           </a:xfrm>
           <a:prstGeom prst="rect">
             <a:avLst/>
@@ -3705,7 +3702,7 @@
         </p:nvSpPr>
         <p:spPr>
           <a:xfrm>
-            <a:off x="457200" y="5052060"/>
+            <a:off x="457200" y="5566410"/>
             <a:ext cx="4087368" cy="274320"/>
           </a:xfrm>
           <a:prstGeom prst="rect">
@@ -3728,7 +3725,7 @@
                 </a:solidFill>
                 <a:latin typeface="Roboto"/>
               </a:rPr>
-              <a:t>Insights</a:t>
+              <a:t>Comments</a:t>
             </a:r>
           </a:p>
         </p:txBody>
@@ -3750,7 +3747,7 @@
         <p:spPr>
           <a:xfrm>
             <a:off x="4572000" y="1965960"/>
-            <a:ext cx="4114800" cy="3086100"/>
+            <a:ext cx="4114800" cy="3600450"/>
           </a:xfrm>
           <a:prstGeom prst="rect">
             <a:avLst/>
@@ -3765,8 +3762,8 @@
         </p:nvSpPr>
         <p:spPr>
           <a:xfrm>
-            <a:off x="4572000" y="5326380"/>
-            <a:ext cx="4087368" cy="1348739"/>
+            <a:off x="4572000" y="5840730"/>
+            <a:ext cx="4087368" cy="834389"/>
           </a:xfrm>
           <a:prstGeom prst="rect">
             <a:avLst/>
@@ -3810,7 +3807,7 @@
         <p:spPr>
           <a:xfrm>
             <a:off x="8686800" y="1965960"/>
-            <a:ext cx="4114800" cy="3086100"/>
+            <a:ext cx="4114800" cy="3600450"/>
           </a:xfrm>
           <a:prstGeom prst="rect">
             <a:avLst/>
@@ -3825,8 +3822,8 @@
         </p:nvSpPr>
         <p:spPr>
           <a:xfrm>
-            <a:off x="8686800" y="5326380"/>
-            <a:ext cx="4087368" cy="1348739"/>
+            <a:off x="8686800" y="5840730"/>
+            <a:ext cx="4087368" cy="834389"/>
           </a:xfrm>
           <a:prstGeom prst="rect">
             <a:avLst/>
@@ -3948,7 +3945,7 @@
                 </a:solidFill>
                 <a:latin typeface="Roboto"/>
               </a:rPr>
-              <a:t>MIXED</a:t>
+              <a:t>SERVICE</a:t>
             </a:r>
           </a:p>
         </p:txBody>
@@ -3976,7 +3973,7 @@
           <a:lstStyle/>
           <a:p>
             <a:r>
-              <a:rPr sz="3600" b="1">
+              <a:rPr sz="2520" b="1">
                 <a:solidFill>
                   <a:srgbClr val="000000"/>
                 </a:solidFill>
@@ -4038,7 +4035,7 @@
         <p:spPr>
           <a:xfrm>
             <a:off x="457200" y="1965960"/>
-            <a:ext cx="4114800" cy="3086100"/>
+            <a:ext cx="4114800" cy="3600450"/>
           </a:xfrm>
           <a:prstGeom prst="rect">
             <a:avLst/>
@@ -4053,8 +4050,8 @@
         </p:nvSpPr>
         <p:spPr>
           <a:xfrm>
-            <a:off x="457200" y="5326380"/>
-            <a:ext cx="4087368" cy="1348739"/>
+            <a:off x="457200" y="5840730"/>
+            <a:ext cx="4087368" cy="834389"/>
           </a:xfrm>
           <a:prstGeom prst="rect">
             <a:avLst/>
@@ -4089,7 +4086,7 @@
         </p:nvSpPr>
         <p:spPr>
           <a:xfrm>
-            <a:off x="457200" y="5052060"/>
+            <a:off x="457200" y="5566410"/>
             <a:ext cx="4087368" cy="274320"/>
           </a:xfrm>
           <a:prstGeom prst="rect">
@@ -4112,7 +4109,7 @@
                 </a:solidFill>
                 <a:latin typeface="Roboto"/>
               </a:rPr>
-              <a:t>Insights</a:t>
+              <a:t>Comments</a:t>
             </a:r>
           </a:p>
         </p:txBody>
@@ -4134,7 +4131,7 @@
         <p:spPr>
           <a:xfrm>
             <a:off x="4572000" y="1965960"/>
-            <a:ext cx="4114800" cy="3086100"/>
+            <a:ext cx="4114800" cy="3600450"/>
           </a:xfrm>
           <a:prstGeom prst="rect">
             <a:avLst/>
@@ -4149,8 +4146,8 @@
         </p:nvSpPr>
         <p:spPr>
           <a:xfrm>
-            <a:off x="4572000" y="5326380"/>
-            <a:ext cx="4087368" cy="1348739"/>
+            <a:off x="4572000" y="5840730"/>
+            <a:ext cx="4087368" cy="834389"/>
           </a:xfrm>
           <a:prstGeom prst="rect">
             <a:avLst/>
@@ -4194,7 +4191,7 @@
         <p:spPr>
           <a:xfrm>
             <a:off x="8686800" y="1965960"/>
-            <a:ext cx="4114800" cy="3086100"/>
+            <a:ext cx="4114800" cy="3600450"/>
           </a:xfrm>
           <a:prstGeom prst="rect">
             <a:avLst/>
@@ -4209,8 +4206,8 @@
         </p:nvSpPr>
         <p:spPr>
           <a:xfrm>
-            <a:off x="8686800" y="5326380"/>
-            <a:ext cx="4087368" cy="1348739"/>
+            <a:off x="8686800" y="5840730"/>
+            <a:ext cx="4087368" cy="834389"/>
           </a:xfrm>
           <a:prstGeom prst="rect">
             <a:avLst/>
@@ -4332,7 +4329,7 @@
                 </a:solidFill>
                 <a:latin typeface="Roboto"/>
               </a:rPr>
-              <a:t>SERVICE</a:t>
+              <a:t>EXPOSURE AND BURN</a:t>
             </a:r>
           </a:p>
         </p:txBody>
@@ -4360,7 +4357,7 @@
           <a:lstStyle/>
           <a:p>
             <a:r>
-              <a:rPr sz="3600" b="1">
+              <a:rPr sz="2520" b="1">
                 <a:solidFill>
                   <a:srgbClr val="000000"/>
                 </a:solidFill>
@@ -4422,7 +4419,7 @@
         <p:spPr>
           <a:xfrm>
             <a:off x="457200" y="1965960"/>
-            <a:ext cx="4114800" cy="3086100"/>
+            <a:ext cx="4114800" cy="3600450"/>
           </a:xfrm>
           <a:prstGeom prst="rect">
             <a:avLst/>
@@ -4437,8 +4434,8 @@
         </p:nvSpPr>
         <p:spPr>
           <a:xfrm>
-            <a:off x="457200" y="5326380"/>
-            <a:ext cx="4087368" cy="1348739"/>
+            <a:off x="457200" y="5840730"/>
+            <a:ext cx="4087368" cy="834389"/>
           </a:xfrm>
           <a:prstGeom prst="rect">
             <a:avLst/>
@@ -4473,7 +4470,7 @@
         </p:nvSpPr>
         <p:spPr>
           <a:xfrm>
-            <a:off x="457200" y="5052060"/>
+            <a:off x="457200" y="5566410"/>
             <a:ext cx="4087368" cy="274320"/>
           </a:xfrm>
           <a:prstGeom prst="rect">
@@ -4496,7 +4493,7 @@
                 </a:solidFill>
                 <a:latin typeface="Roboto"/>
               </a:rPr>
-              <a:t>Insights</a:t>
+              <a:t>Comments</a:t>
             </a:r>
           </a:p>
         </p:txBody>
@@ -4518,7 +4515,7 @@
         <p:spPr>
           <a:xfrm>
             <a:off x="4572000" y="1965960"/>
-            <a:ext cx="4114800" cy="3086100"/>
+            <a:ext cx="4114800" cy="3600450"/>
           </a:xfrm>
           <a:prstGeom prst="rect">
             <a:avLst/>
@@ -4533,8 +4530,8 @@
         </p:nvSpPr>
         <p:spPr>
           <a:xfrm>
-            <a:off x="4572000" y="5326380"/>
-            <a:ext cx="4087368" cy="1348739"/>
+            <a:off x="4572000" y="5840730"/>
+            <a:ext cx="4087368" cy="834389"/>
           </a:xfrm>
           <a:prstGeom prst="rect">
             <a:avLst/>
@@ -4578,7 +4575,7 @@
         <p:spPr>
           <a:xfrm>
             <a:off x="8686800" y="1965960"/>
-            <a:ext cx="4114800" cy="3086100"/>
+            <a:ext cx="4114800" cy="3600450"/>
           </a:xfrm>
           <a:prstGeom prst="rect">
             <a:avLst/>
@@ -4593,8 +4590,8 @@
         </p:nvSpPr>
         <p:spPr>
           <a:xfrm>
-            <a:off x="8686800" y="5326380"/>
-            <a:ext cx="4087368" cy="1348739"/>
+            <a:off x="8686800" y="5840730"/>
+            <a:ext cx="4087368" cy="834389"/>
           </a:xfrm>
           <a:prstGeom prst="rect">
             <a:avLst/>
@@ -4744,7 +4741,7 @@
           <a:lstStyle/>
           <a:p>
             <a:r>
-              <a:rPr sz="3600" b="1">
+              <a:rPr sz="2520" b="1">
                 <a:solidFill>
                   <a:srgbClr val="000000"/>
                 </a:solidFill>
@@ -4784,14 +4781,14 @@
                 </a:solidFill>
                 <a:latin typeface="Roboto"/>
               </a:rPr>
-              <a:t>Priority 5 - </a:t>
+              <a:t>Country overview - </a:t>
             </a:r>
           </a:p>
         </p:txBody>
       </p:sp>
       <p:pic>
         <p:nvPicPr>
-          <p:cNvPr id="7" name="Picture 6" descr="resized_graph_1_3.png"/>
+          <p:cNvPr id="7" name="Picture 6" descr="resized_graph_1_2.png"/>
           <p:cNvPicPr>
             <a:picLocks noChangeAspect="1"/>
           </p:cNvPicPr>
@@ -4805,8 +4802,8 @@
         </p:blipFill>
         <p:spPr>
           <a:xfrm>
-            <a:off x="457200" y="1965960"/>
-            <a:ext cx="4114800" cy="3086100"/>
+            <a:off x="1673352" y="1965960"/>
+            <a:ext cx="4114800" cy="3600450"/>
           </a:xfrm>
           <a:prstGeom prst="rect">
             <a:avLst/>
@@ -4821,8 +4818,8 @@
         </p:nvSpPr>
         <p:spPr>
           <a:xfrm>
-            <a:off x="457200" y="5326380"/>
-            <a:ext cx="4087368" cy="1348739"/>
+            <a:off x="1673352" y="5840730"/>
+            <a:ext cx="4087368" cy="834389"/>
           </a:xfrm>
           <a:prstGeom prst="rect">
             <a:avLst/>
@@ -4844,7 +4841,7 @@
                 </a:solidFill>
                 <a:latin typeface="Roboto"/>
               </a:rPr>
-              <a:t>Mean over the last 4 months: 0.71</a:t>
+              <a:t>Example text</a:t>
             </a:r>
           </a:p>
         </p:txBody>
@@ -4857,7 +4854,7 @@
         </p:nvSpPr>
         <p:spPr>
           <a:xfrm>
-            <a:off x="457200" y="5052060"/>
+            <a:off x="1673352" y="5566410"/>
             <a:ext cx="4087368" cy="274320"/>
           </a:xfrm>
           <a:prstGeom prst="rect">
@@ -4880,14 +4877,14 @@
                 </a:solidFill>
                 <a:latin typeface="Roboto"/>
               </a:rPr>
-              <a:t>Insights</a:t>
+              <a:t>Comments</a:t>
             </a:r>
           </a:p>
         </p:txBody>
       </p:sp>
       <p:pic>
         <p:nvPicPr>
-          <p:cNvPr id="10" name="Picture 9" descr="resized_graph_2_3.png"/>
+          <p:cNvPr id="10" name="Picture 9" descr="resized_graph_2_2.png"/>
           <p:cNvPicPr>
             <a:picLocks noChangeAspect="1"/>
           </p:cNvPicPr>
@@ -4901,8 +4898,8 @@
         </p:blipFill>
         <p:spPr>
           <a:xfrm>
-            <a:off x="4572000" y="1965960"/>
-            <a:ext cx="4114800" cy="3086100"/>
+            <a:off x="7461504" y="1965960"/>
+            <a:ext cx="4114800" cy="3600450"/>
           </a:xfrm>
           <a:prstGeom prst="rect">
             <a:avLst/>
@@ -4917,1220 +4914,8 @@
         </p:nvSpPr>
         <p:spPr>
           <a:xfrm>
-            <a:off x="4572000" y="5326380"/>
-            <a:ext cx="4087368" cy="1348739"/>
-          </a:xfrm>
-          <a:prstGeom prst="rect">
-            <a:avLst/>
-          </a:prstGeom>
-          <a:solidFill>
-            <a:srgbClr val="F2F2F2"/>
-          </a:solidFill>
-        </p:spPr>
-        <p:txBody>
-          <a:bodyPr wrap="square">
-            <a:noAutofit/>
-          </a:bodyPr>
-          <a:lstStyle/>
-          <a:p>
-            <a:r>
-              <a:rPr sz="1080" b="0">
-                <a:solidFill>
-                  <a:srgbClr val="000000"/>
-                </a:solidFill>
-                <a:latin typeface="Roboto"/>
-              </a:rPr>
-              <a:t>Mean over the last 4 months: 7474.25</a:t>
-            </a:r>
-          </a:p>
-        </p:txBody>
-      </p:sp>
-      <p:pic>
-        <p:nvPicPr>
-          <p:cNvPr id="12" name="Picture 11" descr="resized_graph_3_3.png"/>
-          <p:cNvPicPr>
-            <a:picLocks noChangeAspect="1"/>
-          </p:cNvPicPr>
-          <p:nvPr/>
-        </p:nvPicPr>
-        <p:blipFill>
-          <a:blip r:embed="rId6"/>
-          <a:stretch>
-            <a:fillRect/>
-          </a:stretch>
-        </p:blipFill>
-        <p:spPr>
-          <a:xfrm>
-            <a:off x="8686800" y="1965960"/>
-            <a:ext cx="4114800" cy="3086100"/>
-          </a:xfrm>
-          <a:prstGeom prst="rect">
-            <a:avLst/>
-          </a:prstGeom>
-        </p:spPr>
-      </p:pic>
-      <p:sp>
-        <p:nvSpPr>
-          <p:cNvPr id="13" name="TextBox 12"/>
-          <p:cNvSpPr txBox="1"/>
-          <p:nvPr/>
-        </p:nvSpPr>
-        <p:spPr>
-          <a:xfrm>
-            <a:off x="8686800" y="5326380"/>
-            <a:ext cx="4087368" cy="1348739"/>
-          </a:xfrm>
-          <a:prstGeom prst="rect">
-            <a:avLst/>
-          </a:prstGeom>
-          <a:solidFill>
-            <a:srgbClr val="F2F2F2"/>
-          </a:solidFill>
-        </p:spPr>
-        <p:txBody>
-          <a:bodyPr wrap="square">
-            <a:noAutofit/>
-          </a:bodyPr>
-          <a:lstStyle/>
-          <a:p>
-            <a:r>
-              <a:rPr sz="1080" b="0">
-                <a:solidFill>
-                  <a:srgbClr val="000000"/>
-                </a:solidFill>
-                <a:latin typeface="Roboto"/>
-              </a:rPr>
-              <a:t>Mean over the last 4 months: 5317.55</a:t>
-            </a:r>
-          </a:p>
-        </p:txBody>
-      </p:sp>
-    </p:spTree>
-  </p:cSld>
-  <p:clrMapOvr>
-    <a:masterClrMapping/>
-  </p:clrMapOvr>
-</p:sld>
-</file>
-
-<file path=ppt/slides/slide14.xml><?xml version="1.0" encoding="utf-8"?>
-<p:sld xmlns:a="http://schemas.openxmlformats.org/drawingml/2006/main" xmlns:p="http://schemas.openxmlformats.org/presentationml/2006/main" xmlns:r="http://schemas.openxmlformats.org/officeDocument/2006/relationships">
-  <p:cSld>
-    <p:spTree>
-      <p:nvGrpSpPr>
-        <p:cNvPr id="1" name=""/>
-        <p:cNvGrpSpPr/>
-        <p:nvPr/>
-      </p:nvGrpSpPr>
-      <p:grpSpPr/>
-      <p:pic>
-        <p:nvPicPr>
-          <p:cNvPr id="2" name="Picture 1" descr="MX.png"/>
-          <p:cNvPicPr>
-            <a:picLocks noChangeAspect="1"/>
-          </p:cNvPicPr>
-          <p:nvPr/>
-        </p:nvPicPr>
-        <p:blipFill>
-          <a:blip r:embed="rId2"/>
-          <a:stretch>
-            <a:fillRect/>
-          </a:stretch>
-        </p:blipFill>
-        <p:spPr>
-          <a:xfrm>
-            <a:off x="457200" y="91440"/>
-            <a:ext cx="685800" cy="685800"/>
-          </a:xfrm>
-          <a:prstGeom prst="rect">
-            <a:avLst/>
-          </a:prstGeom>
-        </p:spPr>
-      </p:pic>
-      <p:pic>
-        <p:nvPicPr>
-          <p:cNvPr id="3" name="Picture 2" descr="didi.png"/>
-          <p:cNvPicPr>
-            <a:picLocks noChangeAspect="1"/>
-          </p:cNvPicPr>
-          <p:nvPr/>
-        </p:nvPicPr>
-        <p:blipFill>
-          <a:blip r:embed="rId3"/>
-          <a:stretch>
-            <a:fillRect/>
-          </a:stretch>
-        </p:blipFill>
-        <p:spPr>
-          <a:xfrm>
-            <a:off x="11887200" y="9144"/>
-            <a:ext cx="1371600" cy="771525"/>
-          </a:xfrm>
-          <a:prstGeom prst="rect">
-            <a:avLst/>
-          </a:prstGeom>
-        </p:spPr>
-      </p:pic>
-      <p:sp>
-        <p:nvSpPr>
-          <p:cNvPr id="4" name="TextBox 3"/>
-          <p:cNvSpPr txBox="1"/>
-          <p:nvPr/>
-        </p:nvSpPr>
-        <p:spPr>
-          <a:xfrm>
-            <a:off x="1188720" y="91440"/>
-            <a:ext cx="9784080" cy="685800"/>
-          </a:xfrm>
-          <a:prstGeom prst="rect">
-            <a:avLst/>
-          </a:prstGeom>
-          <a:noFill/>
-        </p:spPr>
-        <p:txBody>
-          <a:bodyPr wrap="square" anchor="ctr">
-            <a:noAutofit/>
-          </a:bodyPr>
-          <a:lstStyle/>
-          <a:p>
-            <a:r>
-              <a:rPr sz="3600" b="1">
-                <a:solidFill>
-                  <a:srgbClr val="FC4C02"/>
-                </a:solidFill>
-                <a:latin typeface="Roboto"/>
-              </a:rPr>
-              <a:t>MIXED</a:t>
-            </a:r>
-          </a:p>
-        </p:txBody>
-      </p:sp>
-      <p:sp>
-        <p:nvSpPr>
-          <p:cNvPr id="5" name="TextBox 4"/>
-          <p:cNvSpPr txBox="1"/>
-          <p:nvPr/>
-        </p:nvSpPr>
-        <p:spPr>
-          <a:xfrm>
-            <a:off x="457200" y="777240"/>
-            <a:ext cx="12801600" cy="457200"/>
-          </a:xfrm>
-          <a:prstGeom prst="rect">
-            <a:avLst/>
-          </a:prstGeom>
-          <a:noFill/>
-        </p:spPr>
-        <p:txBody>
-          <a:bodyPr wrap="square" anchor="ctr">
-            <a:noAutofit/>
-          </a:bodyPr>
-          <a:lstStyle/>
-          <a:p>
-            <a:r>
-              <a:rPr sz="3600" b="1">
-                <a:solidFill>
-                  <a:srgbClr val="000000"/>
-                </a:solidFill>
-                <a:latin typeface="Roboto"/>
-              </a:rPr>
-              <a:t>Action Title</a:t>
-            </a:r>
-          </a:p>
-        </p:txBody>
-      </p:sp>
-      <p:sp>
-        <p:nvSpPr>
-          <p:cNvPr id="6" name="TextBox 5"/>
-          <p:cNvSpPr txBox="1"/>
-          <p:nvPr/>
-        </p:nvSpPr>
-        <p:spPr>
-          <a:xfrm>
-            <a:off x="457200" y="1234440"/>
-            <a:ext cx="12801600" cy="365760"/>
-          </a:xfrm>
-          <a:prstGeom prst="rect">
-            <a:avLst/>
-          </a:prstGeom>
-          <a:noFill/>
-        </p:spPr>
-        <p:txBody>
-          <a:bodyPr wrap="square" anchor="ctr">
-            <a:noAutofit/>
-          </a:bodyPr>
-          <a:lstStyle/>
-          <a:p>
-            <a:r>
-              <a:rPr sz="1800" b="0">
-                <a:solidFill>
-                  <a:srgbClr val="000000"/>
-                </a:solidFill>
-                <a:latin typeface="Roboto"/>
-              </a:rPr>
-              <a:t>Priority 5 - </a:t>
-            </a:r>
-          </a:p>
-        </p:txBody>
-      </p:sp>
-      <p:pic>
-        <p:nvPicPr>
-          <p:cNvPr id="7" name="Picture 6" descr="resized_graph_1_3.png"/>
-          <p:cNvPicPr>
-            <a:picLocks noChangeAspect="1"/>
-          </p:cNvPicPr>
-          <p:nvPr/>
-        </p:nvPicPr>
-        <p:blipFill>
-          <a:blip r:embed="rId4"/>
-          <a:stretch>
-            <a:fillRect/>
-          </a:stretch>
-        </p:blipFill>
-        <p:spPr>
-          <a:xfrm>
-            <a:off x="457200" y="1965960"/>
-            <a:ext cx="4114800" cy="3086100"/>
-          </a:xfrm>
-          <a:prstGeom prst="rect">
-            <a:avLst/>
-          </a:prstGeom>
-        </p:spPr>
-      </p:pic>
-      <p:sp>
-        <p:nvSpPr>
-          <p:cNvPr id="8" name="TextBox 7"/>
-          <p:cNvSpPr txBox="1"/>
-          <p:nvPr/>
-        </p:nvSpPr>
-        <p:spPr>
-          <a:xfrm>
-            <a:off x="457200" y="5326380"/>
-            <a:ext cx="4087368" cy="1348739"/>
-          </a:xfrm>
-          <a:prstGeom prst="rect">
-            <a:avLst/>
-          </a:prstGeom>
-          <a:solidFill>
-            <a:srgbClr val="F2F2F2"/>
-          </a:solidFill>
-        </p:spPr>
-        <p:txBody>
-          <a:bodyPr wrap="square">
-            <a:noAutofit/>
-          </a:bodyPr>
-          <a:lstStyle/>
-          <a:p>
-            <a:r>
-              <a:rPr sz="1080" b="0">
-                <a:solidFill>
-                  <a:srgbClr val="000000"/>
-                </a:solidFill>
-                <a:latin typeface="Roboto"/>
-              </a:rPr>
-              <a:t>Example text</a:t>
-            </a:r>
-          </a:p>
-        </p:txBody>
-      </p:sp>
-      <p:sp>
-        <p:nvSpPr>
-          <p:cNvPr id="9" name="TextBox 8"/>
-          <p:cNvSpPr txBox="1"/>
-          <p:nvPr/>
-        </p:nvSpPr>
-        <p:spPr>
-          <a:xfrm>
-            <a:off x="457200" y="5052060"/>
-            <a:ext cx="4087368" cy="274320"/>
-          </a:xfrm>
-          <a:prstGeom prst="rect">
-            <a:avLst/>
-          </a:prstGeom>
-          <a:solidFill>
-            <a:srgbClr val="FC4C02"/>
-          </a:solidFill>
-        </p:spPr>
-        <p:txBody>
-          <a:bodyPr wrap="square" anchor="ctr">
-            <a:noAutofit/>
-          </a:bodyPr>
-          <a:lstStyle/>
-          <a:p>
-            <a:r>
-              <a:rPr sz="1440" b="0">
-                <a:solidFill>
-                  <a:srgbClr val="FFFFFF"/>
-                </a:solidFill>
-                <a:latin typeface="Roboto"/>
-              </a:rPr>
-              <a:t>Insights</a:t>
-            </a:r>
-          </a:p>
-        </p:txBody>
-      </p:sp>
-      <p:pic>
-        <p:nvPicPr>
-          <p:cNvPr id="10" name="Picture 9" descr="resized_graph_2_3.png"/>
-          <p:cNvPicPr>
-            <a:picLocks noChangeAspect="1"/>
-          </p:cNvPicPr>
-          <p:nvPr/>
-        </p:nvPicPr>
-        <p:blipFill>
-          <a:blip r:embed="rId5"/>
-          <a:stretch>
-            <a:fillRect/>
-          </a:stretch>
-        </p:blipFill>
-        <p:spPr>
-          <a:xfrm>
-            <a:off x="4572000" y="1965960"/>
-            <a:ext cx="4114800" cy="3086100"/>
-          </a:xfrm>
-          <a:prstGeom prst="rect">
-            <a:avLst/>
-          </a:prstGeom>
-        </p:spPr>
-      </p:pic>
-      <p:sp>
-        <p:nvSpPr>
-          <p:cNvPr id="11" name="TextBox 10"/>
-          <p:cNvSpPr txBox="1"/>
-          <p:nvPr/>
-        </p:nvSpPr>
-        <p:spPr>
-          <a:xfrm>
-            <a:off x="4572000" y="5326380"/>
-            <a:ext cx="4087368" cy="1348739"/>
-          </a:xfrm>
-          <a:prstGeom prst="rect">
-            <a:avLst/>
-          </a:prstGeom>
-          <a:solidFill>
-            <a:srgbClr val="F2F2F2"/>
-          </a:solidFill>
-        </p:spPr>
-        <p:txBody>
-          <a:bodyPr wrap="square">
-            <a:noAutofit/>
-          </a:bodyPr>
-          <a:lstStyle/>
-          <a:p>
-            <a:r>
-              <a:rPr sz="1080" b="0">
-                <a:solidFill>
-                  <a:srgbClr val="000000"/>
-                </a:solidFill>
-                <a:latin typeface="Roboto"/>
-              </a:rPr>
-              <a:t>Example text</a:t>
-            </a:r>
-          </a:p>
-        </p:txBody>
-      </p:sp>
-      <p:pic>
-        <p:nvPicPr>
-          <p:cNvPr id="12" name="Picture 11" descr="resized_graph_3_3.png"/>
-          <p:cNvPicPr>
-            <a:picLocks noChangeAspect="1"/>
-          </p:cNvPicPr>
-          <p:nvPr/>
-        </p:nvPicPr>
-        <p:blipFill>
-          <a:blip r:embed="rId6"/>
-          <a:stretch>
-            <a:fillRect/>
-          </a:stretch>
-        </p:blipFill>
-        <p:spPr>
-          <a:xfrm>
-            <a:off x="8686800" y="1965960"/>
-            <a:ext cx="4114800" cy="3086100"/>
-          </a:xfrm>
-          <a:prstGeom prst="rect">
-            <a:avLst/>
-          </a:prstGeom>
-        </p:spPr>
-      </p:pic>
-      <p:sp>
-        <p:nvSpPr>
-          <p:cNvPr id="13" name="TextBox 12"/>
-          <p:cNvSpPr txBox="1"/>
-          <p:nvPr/>
-        </p:nvSpPr>
-        <p:spPr>
-          <a:xfrm>
-            <a:off x="8686800" y="5326380"/>
-            <a:ext cx="4087368" cy="1348739"/>
-          </a:xfrm>
-          <a:prstGeom prst="rect">
-            <a:avLst/>
-          </a:prstGeom>
-          <a:solidFill>
-            <a:srgbClr val="F2F2F2"/>
-          </a:solidFill>
-        </p:spPr>
-        <p:txBody>
-          <a:bodyPr wrap="square">
-            <a:noAutofit/>
-          </a:bodyPr>
-          <a:lstStyle/>
-          <a:p>
-            <a:r>
-              <a:rPr sz="1080" b="0">
-                <a:solidFill>
-                  <a:srgbClr val="000000"/>
-                </a:solidFill>
-                <a:latin typeface="Roboto"/>
-              </a:rPr>
-              <a:t>Example text</a:t>
-            </a:r>
-          </a:p>
-        </p:txBody>
-      </p:sp>
-    </p:spTree>
-  </p:cSld>
-  <p:clrMapOvr>
-    <a:masterClrMapping/>
-  </p:clrMapOvr>
-</p:sld>
-</file>
-
-<file path=ppt/slides/slide15.xml><?xml version="1.0" encoding="utf-8"?>
-<p:sld xmlns:a="http://schemas.openxmlformats.org/drawingml/2006/main" xmlns:p="http://schemas.openxmlformats.org/presentationml/2006/main" xmlns:r="http://schemas.openxmlformats.org/officeDocument/2006/relationships">
-  <p:cSld>
-    <p:spTree>
-      <p:nvGrpSpPr>
-        <p:cNvPr id="1" name=""/>
-        <p:cNvGrpSpPr/>
-        <p:nvPr/>
-      </p:nvGrpSpPr>
-      <p:grpSpPr/>
-      <p:pic>
-        <p:nvPicPr>
-          <p:cNvPr id="2" name="Picture 1" descr="MX.png"/>
-          <p:cNvPicPr>
-            <a:picLocks noChangeAspect="1"/>
-          </p:cNvPicPr>
-          <p:nvPr/>
-        </p:nvPicPr>
-        <p:blipFill>
-          <a:blip r:embed="rId2"/>
-          <a:stretch>
-            <a:fillRect/>
-          </a:stretch>
-        </p:blipFill>
-        <p:spPr>
-          <a:xfrm>
-            <a:off x="457200" y="91440"/>
-            <a:ext cx="685800" cy="685800"/>
-          </a:xfrm>
-          <a:prstGeom prst="rect">
-            <a:avLst/>
-          </a:prstGeom>
-        </p:spPr>
-      </p:pic>
-      <p:pic>
-        <p:nvPicPr>
-          <p:cNvPr id="3" name="Picture 2" descr="didi.png"/>
-          <p:cNvPicPr>
-            <a:picLocks noChangeAspect="1"/>
-          </p:cNvPicPr>
-          <p:nvPr/>
-        </p:nvPicPr>
-        <p:blipFill>
-          <a:blip r:embed="rId3"/>
-          <a:stretch>
-            <a:fillRect/>
-          </a:stretch>
-        </p:blipFill>
-        <p:spPr>
-          <a:xfrm>
-            <a:off x="11887200" y="9144"/>
-            <a:ext cx="1371600" cy="771525"/>
-          </a:xfrm>
-          <a:prstGeom prst="rect">
-            <a:avLst/>
-          </a:prstGeom>
-        </p:spPr>
-      </p:pic>
-      <p:sp>
-        <p:nvSpPr>
-          <p:cNvPr id="4" name="TextBox 3"/>
-          <p:cNvSpPr txBox="1"/>
-          <p:nvPr/>
-        </p:nvSpPr>
-        <p:spPr>
-          <a:xfrm>
-            <a:off x="1188720" y="91440"/>
-            <a:ext cx="9784080" cy="685800"/>
-          </a:xfrm>
-          <a:prstGeom prst="rect">
-            <a:avLst/>
-          </a:prstGeom>
-          <a:noFill/>
-        </p:spPr>
-        <p:txBody>
-          <a:bodyPr wrap="square" anchor="ctr">
-            <a:noAutofit/>
-          </a:bodyPr>
-          <a:lstStyle/>
-          <a:p>
-            <a:r>
-              <a:rPr sz="3600" b="1">
-                <a:solidFill>
-                  <a:srgbClr val="FC4C02"/>
-                </a:solidFill>
-                <a:latin typeface="Roboto"/>
-              </a:rPr>
-              <a:t>SERVICE</a:t>
-            </a:r>
-          </a:p>
-        </p:txBody>
-      </p:sp>
-      <p:sp>
-        <p:nvSpPr>
-          <p:cNvPr id="5" name="TextBox 4"/>
-          <p:cNvSpPr txBox="1"/>
-          <p:nvPr/>
-        </p:nvSpPr>
-        <p:spPr>
-          <a:xfrm>
-            <a:off x="457200" y="777240"/>
-            <a:ext cx="12801600" cy="457200"/>
-          </a:xfrm>
-          <a:prstGeom prst="rect">
-            <a:avLst/>
-          </a:prstGeom>
-          <a:noFill/>
-        </p:spPr>
-        <p:txBody>
-          <a:bodyPr wrap="square" anchor="ctr">
-            <a:noAutofit/>
-          </a:bodyPr>
-          <a:lstStyle/>
-          <a:p>
-            <a:r>
-              <a:rPr sz="3600" b="1">
-                <a:solidFill>
-                  <a:srgbClr val="000000"/>
-                </a:solidFill>
-                <a:latin typeface="Roboto"/>
-              </a:rPr>
-              <a:t>Action Title</a:t>
-            </a:r>
-          </a:p>
-        </p:txBody>
-      </p:sp>
-      <p:sp>
-        <p:nvSpPr>
-          <p:cNvPr id="6" name="TextBox 5"/>
-          <p:cNvSpPr txBox="1"/>
-          <p:nvPr/>
-        </p:nvSpPr>
-        <p:spPr>
-          <a:xfrm>
-            <a:off x="457200" y="1234440"/>
-            <a:ext cx="12801600" cy="365760"/>
-          </a:xfrm>
-          <a:prstGeom prst="rect">
-            <a:avLst/>
-          </a:prstGeom>
-          <a:noFill/>
-        </p:spPr>
-        <p:txBody>
-          <a:bodyPr wrap="square" anchor="ctr">
-            <a:noAutofit/>
-          </a:bodyPr>
-          <a:lstStyle/>
-          <a:p>
-            <a:r>
-              <a:rPr sz="1800" b="0">
-                <a:solidFill>
-                  <a:srgbClr val="000000"/>
-                </a:solidFill>
-                <a:latin typeface="Roboto"/>
-              </a:rPr>
-              <a:t>Priority 5 - </a:t>
-            </a:r>
-          </a:p>
-        </p:txBody>
-      </p:sp>
-      <p:pic>
-        <p:nvPicPr>
-          <p:cNvPr id="7" name="Picture 6" descr="resized_graph_1_3.png"/>
-          <p:cNvPicPr>
-            <a:picLocks noChangeAspect="1"/>
-          </p:cNvPicPr>
-          <p:nvPr/>
-        </p:nvPicPr>
-        <p:blipFill>
-          <a:blip r:embed="rId4"/>
-          <a:stretch>
-            <a:fillRect/>
-          </a:stretch>
-        </p:blipFill>
-        <p:spPr>
-          <a:xfrm>
-            <a:off x="457200" y="1965960"/>
-            <a:ext cx="4114800" cy="3086100"/>
-          </a:xfrm>
-          <a:prstGeom prst="rect">
-            <a:avLst/>
-          </a:prstGeom>
-        </p:spPr>
-      </p:pic>
-      <p:sp>
-        <p:nvSpPr>
-          <p:cNvPr id="8" name="TextBox 7"/>
-          <p:cNvSpPr txBox="1"/>
-          <p:nvPr/>
-        </p:nvSpPr>
-        <p:spPr>
-          <a:xfrm>
-            <a:off x="457200" y="5326380"/>
-            <a:ext cx="4087368" cy="1348739"/>
-          </a:xfrm>
-          <a:prstGeom prst="rect">
-            <a:avLst/>
-          </a:prstGeom>
-          <a:solidFill>
-            <a:srgbClr val="F2F2F2"/>
-          </a:solidFill>
-        </p:spPr>
-        <p:txBody>
-          <a:bodyPr wrap="square">
-            <a:noAutofit/>
-          </a:bodyPr>
-          <a:lstStyle/>
-          <a:p>
-            <a:r>
-              <a:rPr sz="1080" b="0">
-                <a:solidFill>
-                  <a:srgbClr val="000000"/>
-                </a:solidFill>
-                <a:latin typeface="Roboto"/>
-              </a:rPr>
-              <a:t>Example text</a:t>
-            </a:r>
-          </a:p>
-        </p:txBody>
-      </p:sp>
-      <p:sp>
-        <p:nvSpPr>
-          <p:cNvPr id="9" name="TextBox 8"/>
-          <p:cNvSpPr txBox="1"/>
-          <p:nvPr/>
-        </p:nvSpPr>
-        <p:spPr>
-          <a:xfrm>
-            <a:off x="457200" y="5052060"/>
-            <a:ext cx="4087368" cy="274320"/>
-          </a:xfrm>
-          <a:prstGeom prst="rect">
-            <a:avLst/>
-          </a:prstGeom>
-          <a:solidFill>
-            <a:srgbClr val="FC4C02"/>
-          </a:solidFill>
-        </p:spPr>
-        <p:txBody>
-          <a:bodyPr wrap="square" anchor="ctr">
-            <a:noAutofit/>
-          </a:bodyPr>
-          <a:lstStyle/>
-          <a:p>
-            <a:r>
-              <a:rPr sz="1440" b="0">
-                <a:solidFill>
-                  <a:srgbClr val="FFFFFF"/>
-                </a:solidFill>
-                <a:latin typeface="Roboto"/>
-              </a:rPr>
-              <a:t>Insights</a:t>
-            </a:r>
-          </a:p>
-        </p:txBody>
-      </p:sp>
-      <p:pic>
-        <p:nvPicPr>
-          <p:cNvPr id="10" name="Picture 9" descr="resized_graph_2_3.png"/>
-          <p:cNvPicPr>
-            <a:picLocks noChangeAspect="1"/>
-          </p:cNvPicPr>
-          <p:nvPr/>
-        </p:nvPicPr>
-        <p:blipFill>
-          <a:blip r:embed="rId5"/>
-          <a:stretch>
-            <a:fillRect/>
-          </a:stretch>
-        </p:blipFill>
-        <p:spPr>
-          <a:xfrm>
-            <a:off x="4572000" y="1965960"/>
-            <a:ext cx="4114800" cy="3086100"/>
-          </a:xfrm>
-          <a:prstGeom prst="rect">
-            <a:avLst/>
-          </a:prstGeom>
-        </p:spPr>
-      </p:pic>
-      <p:sp>
-        <p:nvSpPr>
-          <p:cNvPr id="11" name="TextBox 10"/>
-          <p:cNvSpPr txBox="1"/>
-          <p:nvPr/>
-        </p:nvSpPr>
-        <p:spPr>
-          <a:xfrm>
-            <a:off x="4572000" y="5326380"/>
-            <a:ext cx="4087368" cy="1348739"/>
-          </a:xfrm>
-          <a:prstGeom prst="rect">
-            <a:avLst/>
-          </a:prstGeom>
-          <a:solidFill>
-            <a:srgbClr val="F2F2F2"/>
-          </a:solidFill>
-        </p:spPr>
-        <p:txBody>
-          <a:bodyPr wrap="square">
-            <a:noAutofit/>
-          </a:bodyPr>
-          <a:lstStyle/>
-          <a:p>
-            <a:r>
-              <a:rPr sz="1080" b="0">
-                <a:solidFill>
-                  <a:srgbClr val="000000"/>
-                </a:solidFill>
-                <a:latin typeface="Roboto"/>
-              </a:rPr>
-              <a:t>Example text</a:t>
-            </a:r>
-          </a:p>
-        </p:txBody>
-      </p:sp>
-      <p:pic>
-        <p:nvPicPr>
-          <p:cNvPr id="12" name="Picture 11" descr="resized_graph_3_3.png"/>
-          <p:cNvPicPr>
-            <a:picLocks noChangeAspect="1"/>
-          </p:cNvPicPr>
-          <p:nvPr/>
-        </p:nvPicPr>
-        <p:blipFill>
-          <a:blip r:embed="rId6"/>
-          <a:stretch>
-            <a:fillRect/>
-          </a:stretch>
-        </p:blipFill>
-        <p:spPr>
-          <a:xfrm>
-            <a:off x="8686800" y="1965960"/>
-            <a:ext cx="4114800" cy="3086100"/>
-          </a:xfrm>
-          <a:prstGeom prst="rect">
-            <a:avLst/>
-          </a:prstGeom>
-        </p:spPr>
-      </p:pic>
-      <p:sp>
-        <p:nvSpPr>
-          <p:cNvPr id="13" name="TextBox 12"/>
-          <p:cNvSpPr txBox="1"/>
-          <p:nvPr/>
-        </p:nvSpPr>
-        <p:spPr>
-          <a:xfrm>
-            <a:off x="8686800" y="5326380"/>
-            <a:ext cx="4087368" cy="1348739"/>
-          </a:xfrm>
-          <a:prstGeom prst="rect">
-            <a:avLst/>
-          </a:prstGeom>
-          <a:solidFill>
-            <a:srgbClr val="F2F2F2"/>
-          </a:solidFill>
-        </p:spPr>
-        <p:txBody>
-          <a:bodyPr wrap="square">
-            <a:noAutofit/>
-          </a:bodyPr>
-          <a:lstStyle/>
-          <a:p>
-            <a:r>
-              <a:rPr sz="1080" b="0">
-                <a:solidFill>
-                  <a:srgbClr val="000000"/>
-                </a:solidFill>
-                <a:latin typeface="Roboto"/>
-              </a:rPr>
-              <a:t>Example text</a:t>
-            </a:r>
-          </a:p>
-        </p:txBody>
-      </p:sp>
-    </p:spTree>
-  </p:cSld>
-  <p:clrMapOvr>
-    <a:masterClrMapping/>
-  </p:clrMapOvr>
-</p:sld>
-</file>
-
-<file path=ppt/slides/slide16.xml><?xml version="1.0" encoding="utf-8"?>
-<p:sld xmlns:a="http://schemas.openxmlformats.org/drawingml/2006/main" xmlns:p="http://schemas.openxmlformats.org/presentationml/2006/main" xmlns:r="http://schemas.openxmlformats.org/officeDocument/2006/relationships">
-  <p:cSld>
-    <p:spTree>
-      <p:nvGrpSpPr>
-        <p:cNvPr id="1" name=""/>
-        <p:cNvGrpSpPr/>
-        <p:nvPr/>
-      </p:nvGrpSpPr>
-      <p:grpSpPr/>
-      <p:pic>
-        <p:nvPicPr>
-          <p:cNvPr id="2" name="Picture 1" descr="MX.png"/>
-          <p:cNvPicPr>
-            <a:picLocks noChangeAspect="1"/>
-          </p:cNvPicPr>
-          <p:nvPr/>
-        </p:nvPicPr>
-        <p:blipFill>
-          <a:blip r:embed="rId2"/>
-          <a:stretch>
-            <a:fillRect/>
-          </a:stretch>
-        </p:blipFill>
-        <p:spPr>
-          <a:xfrm>
-            <a:off x="457200" y="91440"/>
-            <a:ext cx="685800" cy="685800"/>
-          </a:xfrm>
-          <a:prstGeom prst="rect">
-            <a:avLst/>
-          </a:prstGeom>
-        </p:spPr>
-      </p:pic>
-      <p:pic>
-        <p:nvPicPr>
-          <p:cNvPr id="3" name="Picture 2" descr="didi.png"/>
-          <p:cNvPicPr>
-            <a:picLocks noChangeAspect="1"/>
-          </p:cNvPicPr>
-          <p:nvPr/>
-        </p:nvPicPr>
-        <p:blipFill>
-          <a:blip r:embed="rId3"/>
-          <a:stretch>
-            <a:fillRect/>
-          </a:stretch>
-        </p:blipFill>
-        <p:spPr>
-          <a:xfrm>
-            <a:off x="11887200" y="9144"/>
-            <a:ext cx="1371600" cy="771525"/>
-          </a:xfrm>
-          <a:prstGeom prst="rect">
-            <a:avLst/>
-          </a:prstGeom>
-        </p:spPr>
-      </p:pic>
-      <p:sp>
-        <p:nvSpPr>
-          <p:cNvPr id="4" name="TextBox 3"/>
-          <p:cNvSpPr txBox="1"/>
-          <p:nvPr/>
-        </p:nvSpPr>
-        <p:spPr>
-          <a:xfrm>
-            <a:off x="1188720" y="91440"/>
-            <a:ext cx="9784080" cy="685800"/>
-          </a:xfrm>
-          <a:prstGeom prst="rect">
-            <a:avLst/>
-          </a:prstGeom>
-          <a:noFill/>
-        </p:spPr>
-        <p:txBody>
-          <a:bodyPr wrap="square" anchor="ctr">
-            <a:noAutofit/>
-          </a:bodyPr>
-          <a:lstStyle/>
-          <a:p>
-            <a:r>
-              <a:rPr sz="3600" b="1">
-                <a:solidFill>
-                  <a:srgbClr val="FC4C02"/>
-                </a:solidFill>
-                <a:latin typeface="Roboto"/>
-              </a:rPr>
-              <a:t>PERFORMANCE</a:t>
-            </a:r>
-          </a:p>
-        </p:txBody>
-      </p:sp>
-      <p:sp>
-        <p:nvSpPr>
-          <p:cNvPr id="5" name="TextBox 4"/>
-          <p:cNvSpPr txBox="1"/>
-          <p:nvPr/>
-        </p:nvSpPr>
-        <p:spPr>
-          <a:xfrm>
-            <a:off x="457200" y="777240"/>
-            <a:ext cx="12801600" cy="457200"/>
-          </a:xfrm>
-          <a:prstGeom prst="rect">
-            <a:avLst/>
-          </a:prstGeom>
-          <a:noFill/>
-        </p:spPr>
-        <p:txBody>
-          <a:bodyPr wrap="square" anchor="ctr">
-            <a:noAutofit/>
-          </a:bodyPr>
-          <a:lstStyle/>
-          <a:p>
-            <a:r>
-              <a:rPr sz="3600" b="1">
-                <a:solidFill>
-                  <a:srgbClr val="000000"/>
-                </a:solidFill>
-                <a:latin typeface="Roboto"/>
-              </a:rPr>
-              <a:t>Action Title</a:t>
-            </a:r>
-          </a:p>
-        </p:txBody>
-      </p:sp>
-      <p:sp>
-        <p:nvSpPr>
-          <p:cNvPr id="6" name="TextBox 5"/>
-          <p:cNvSpPr txBox="1"/>
-          <p:nvPr/>
-        </p:nvSpPr>
-        <p:spPr>
-          <a:xfrm>
-            <a:off x="457200" y="1234440"/>
-            <a:ext cx="12801600" cy="365760"/>
-          </a:xfrm>
-          <a:prstGeom prst="rect">
-            <a:avLst/>
-          </a:prstGeom>
-          <a:noFill/>
-        </p:spPr>
-        <p:txBody>
-          <a:bodyPr wrap="square" anchor="ctr">
-            <a:noAutofit/>
-          </a:bodyPr>
-          <a:lstStyle/>
-          <a:p>
-            <a:r>
-              <a:rPr sz="1800" b="0">
-                <a:solidFill>
-                  <a:srgbClr val="000000"/>
-                </a:solidFill>
-                <a:latin typeface="Roboto"/>
-              </a:rPr>
-              <a:t>Country overview - </a:t>
-            </a:r>
-          </a:p>
-        </p:txBody>
-      </p:sp>
-      <p:pic>
-        <p:nvPicPr>
-          <p:cNvPr id="7" name="Picture 6" descr="resized_graph_1_3.png"/>
-          <p:cNvPicPr>
-            <a:picLocks noChangeAspect="1"/>
-          </p:cNvPicPr>
-          <p:nvPr/>
-        </p:nvPicPr>
-        <p:blipFill>
-          <a:blip r:embed="rId4"/>
-          <a:stretch>
-            <a:fillRect/>
-          </a:stretch>
-        </p:blipFill>
-        <p:spPr>
-          <a:xfrm>
-            <a:off x="457200" y="1965960"/>
-            <a:ext cx="4114800" cy="3086100"/>
-          </a:xfrm>
-          <a:prstGeom prst="rect">
-            <a:avLst/>
-          </a:prstGeom>
-        </p:spPr>
-      </p:pic>
-      <p:sp>
-        <p:nvSpPr>
-          <p:cNvPr id="8" name="TextBox 7"/>
-          <p:cNvSpPr txBox="1"/>
-          <p:nvPr/>
-        </p:nvSpPr>
-        <p:spPr>
-          <a:xfrm>
-            <a:off x="457200" y="5326380"/>
-            <a:ext cx="4087368" cy="1348739"/>
-          </a:xfrm>
-          <a:prstGeom prst="rect">
-            <a:avLst/>
-          </a:prstGeom>
-          <a:solidFill>
-            <a:srgbClr val="F2F2F2"/>
-          </a:solidFill>
-        </p:spPr>
-        <p:txBody>
-          <a:bodyPr wrap="square">
-            <a:noAutofit/>
-          </a:bodyPr>
-          <a:lstStyle/>
-          <a:p>
-            <a:r>
-              <a:rPr sz="1080" b="0">
-                <a:solidFill>
-                  <a:srgbClr val="000000"/>
-                </a:solidFill>
-                <a:latin typeface="Roboto"/>
-              </a:rPr>
-              <a:t>Example text</a:t>
-            </a:r>
-          </a:p>
-        </p:txBody>
-      </p:sp>
-      <p:sp>
-        <p:nvSpPr>
-          <p:cNvPr id="9" name="TextBox 8"/>
-          <p:cNvSpPr txBox="1"/>
-          <p:nvPr/>
-        </p:nvSpPr>
-        <p:spPr>
-          <a:xfrm>
-            <a:off x="457200" y="5052060"/>
-            <a:ext cx="4087368" cy="274320"/>
-          </a:xfrm>
-          <a:prstGeom prst="rect">
-            <a:avLst/>
-          </a:prstGeom>
-          <a:solidFill>
-            <a:srgbClr val="FC4C02"/>
-          </a:solidFill>
-        </p:spPr>
-        <p:txBody>
-          <a:bodyPr wrap="square" anchor="ctr">
-            <a:noAutofit/>
-          </a:bodyPr>
-          <a:lstStyle/>
-          <a:p>
-            <a:r>
-              <a:rPr sz="1440" b="0">
-                <a:solidFill>
-                  <a:srgbClr val="FFFFFF"/>
-                </a:solidFill>
-                <a:latin typeface="Roboto"/>
-              </a:rPr>
-              <a:t>Insights</a:t>
-            </a:r>
-          </a:p>
-        </p:txBody>
-      </p:sp>
-      <p:pic>
-        <p:nvPicPr>
-          <p:cNvPr id="10" name="Picture 9" descr="resized_graph_2_3.png"/>
-          <p:cNvPicPr>
-            <a:picLocks noChangeAspect="1"/>
-          </p:cNvPicPr>
-          <p:nvPr/>
-        </p:nvPicPr>
-        <p:blipFill>
-          <a:blip r:embed="rId5"/>
-          <a:stretch>
-            <a:fillRect/>
-          </a:stretch>
-        </p:blipFill>
-        <p:spPr>
-          <a:xfrm>
-            <a:off x="4572000" y="1965960"/>
-            <a:ext cx="4114800" cy="3086100"/>
-          </a:xfrm>
-          <a:prstGeom prst="rect">
-            <a:avLst/>
-          </a:prstGeom>
-        </p:spPr>
-      </p:pic>
-      <p:sp>
-        <p:nvSpPr>
-          <p:cNvPr id="11" name="TextBox 10"/>
-          <p:cNvSpPr txBox="1"/>
-          <p:nvPr/>
-        </p:nvSpPr>
-        <p:spPr>
-          <a:xfrm>
-            <a:off x="4572000" y="5326380"/>
-            <a:ext cx="4087368" cy="1348739"/>
-          </a:xfrm>
-          <a:prstGeom prst="rect">
-            <a:avLst/>
-          </a:prstGeom>
-          <a:solidFill>
-            <a:srgbClr val="F2F2F2"/>
-          </a:solidFill>
-        </p:spPr>
-        <p:txBody>
-          <a:bodyPr wrap="square">
-            <a:noAutofit/>
-          </a:bodyPr>
-          <a:lstStyle/>
-          <a:p>
-            <a:r>
-              <a:rPr sz="1080" b="0">
-                <a:solidFill>
-                  <a:srgbClr val="000000"/>
-                </a:solidFill>
-                <a:latin typeface="Roboto"/>
-              </a:rPr>
-              <a:t>Example text</a:t>
-            </a:r>
-          </a:p>
-        </p:txBody>
-      </p:sp>
-      <p:pic>
-        <p:nvPicPr>
-          <p:cNvPr id="12" name="Picture 11" descr="resized_graph_3_3.png"/>
-          <p:cNvPicPr>
-            <a:picLocks noChangeAspect="1"/>
-          </p:cNvPicPr>
-          <p:nvPr/>
-        </p:nvPicPr>
-        <p:blipFill>
-          <a:blip r:embed="rId6"/>
-          <a:stretch>
-            <a:fillRect/>
-          </a:stretch>
-        </p:blipFill>
-        <p:spPr>
-          <a:xfrm>
-            <a:off x="8686800" y="1965960"/>
-            <a:ext cx="4114800" cy="3086100"/>
-          </a:xfrm>
-          <a:prstGeom prst="rect">
-            <a:avLst/>
-          </a:prstGeom>
-        </p:spPr>
-      </p:pic>
-      <p:sp>
-        <p:nvSpPr>
-          <p:cNvPr id="13" name="TextBox 12"/>
-          <p:cNvSpPr txBox="1"/>
-          <p:nvPr/>
-        </p:nvSpPr>
-        <p:spPr>
-          <a:xfrm>
-            <a:off x="8686800" y="5326380"/>
-            <a:ext cx="4087368" cy="1348739"/>
+            <a:off x="7461504" y="5840730"/>
+            <a:ext cx="4087368" cy="834389"/>
           </a:xfrm>
           <a:prstGeom prst="rect">
             <a:avLst/>
@@ -6252,7 +5037,7 @@
                 </a:solidFill>
                 <a:latin typeface="Roboto"/>
               </a:rPr>
-              <a:t>MIXED</a:t>
+              <a:t>SERVICE</a:t>
             </a:r>
           </a:p>
         </p:txBody>
@@ -6280,7 +5065,7 @@
           <a:lstStyle/>
           <a:p>
             <a:r>
-              <a:rPr sz="3600" b="1">
+              <a:rPr sz="2520" b="1">
                 <a:solidFill>
                   <a:srgbClr val="000000"/>
                 </a:solidFill>
@@ -6342,7 +5127,7 @@
         <p:spPr>
           <a:xfrm>
             <a:off x="457200" y="1965960"/>
-            <a:ext cx="4114800" cy="3086100"/>
+            <a:ext cx="4114800" cy="3600450"/>
           </a:xfrm>
           <a:prstGeom prst="rect">
             <a:avLst/>
@@ -6357,8 +5142,8 @@
         </p:nvSpPr>
         <p:spPr>
           <a:xfrm>
-            <a:off x="457200" y="5326380"/>
-            <a:ext cx="4087368" cy="1348739"/>
+            <a:off x="457200" y="5840730"/>
+            <a:ext cx="4087368" cy="834389"/>
           </a:xfrm>
           <a:prstGeom prst="rect">
             <a:avLst/>
@@ -6393,7 +5178,7 @@
         </p:nvSpPr>
         <p:spPr>
           <a:xfrm>
-            <a:off x="457200" y="5052060"/>
+            <a:off x="457200" y="5566410"/>
             <a:ext cx="4087368" cy="274320"/>
           </a:xfrm>
           <a:prstGeom prst="rect">
@@ -6416,7 +5201,7 @@
                 </a:solidFill>
                 <a:latin typeface="Roboto"/>
               </a:rPr>
-              <a:t>Insights</a:t>
+              <a:t>Comments</a:t>
             </a:r>
           </a:p>
         </p:txBody>
@@ -6438,7 +5223,7 @@
         <p:spPr>
           <a:xfrm>
             <a:off x="4572000" y="1965960"/>
-            <a:ext cx="4114800" cy="3086100"/>
+            <a:ext cx="4114800" cy="3600450"/>
           </a:xfrm>
           <a:prstGeom prst="rect">
             <a:avLst/>
@@ -6453,8 +5238,8 @@
         </p:nvSpPr>
         <p:spPr>
           <a:xfrm>
-            <a:off x="4572000" y="5326380"/>
-            <a:ext cx="4087368" cy="1348739"/>
+            <a:off x="4572000" y="5840730"/>
+            <a:ext cx="4087368" cy="834389"/>
           </a:xfrm>
           <a:prstGeom prst="rect">
             <a:avLst/>
@@ -6498,7 +5283,7 @@
         <p:spPr>
           <a:xfrm>
             <a:off x="8686800" y="1965960"/>
-            <a:ext cx="4114800" cy="3086100"/>
+            <a:ext cx="4114800" cy="3600450"/>
           </a:xfrm>
           <a:prstGeom prst="rect">
             <a:avLst/>
@@ -6513,8 +5298,8 @@
         </p:nvSpPr>
         <p:spPr>
           <a:xfrm>
-            <a:off x="8686800" y="5326380"/>
-            <a:ext cx="4087368" cy="1348739"/>
+            <a:off x="8686800" y="5840730"/>
+            <a:ext cx="4087368" cy="834389"/>
           </a:xfrm>
           <a:prstGeom prst="rect">
             <a:avLst/>
@@ -6636,7 +5421,7 @@
                 </a:solidFill>
                 <a:latin typeface="Roboto"/>
               </a:rPr>
-              <a:t>SERVICE</a:t>
+              <a:t>EXPOSURE AND BURN</a:t>
             </a:r>
           </a:p>
         </p:txBody>
@@ -6664,7 +5449,7 @@
           <a:lstStyle/>
           <a:p>
             <a:r>
-              <a:rPr sz="3600" b="1">
+              <a:rPr sz="2520" b="1">
                 <a:solidFill>
                   <a:srgbClr val="000000"/>
                 </a:solidFill>
@@ -6726,7 +5511,7 @@
         <p:spPr>
           <a:xfrm>
             <a:off x="457200" y="1965960"/>
-            <a:ext cx="4114800" cy="3086100"/>
+            <a:ext cx="4114800" cy="3600450"/>
           </a:xfrm>
           <a:prstGeom prst="rect">
             <a:avLst/>
@@ -6741,8 +5526,8 @@
         </p:nvSpPr>
         <p:spPr>
           <a:xfrm>
-            <a:off x="457200" y="5326380"/>
-            <a:ext cx="4087368" cy="1348739"/>
+            <a:off x="457200" y="5840730"/>
+            <a:ext cx="4087368" cy="834389"/>
           </a:xfrm>
           <a:prstGeom prst="rect">
             <a:avLst/>
@@ -6777,7 +5562,7 @@
         </p:nvSpPr>
         <p:spPr>
           <a:xfrm>
-            <a:off x="457200" y="5052060"/>
+            <a:off x="457200" y="5566410"/>
             <a:ext cx="4087368" cy="274320"/>
           </a:xfrm>
           <a:prstGeom prst="rect">
@@ -6800,7 +5585,7 @@
                 </a:solidFill>
                 <a:latin typeface="Roboto"/>
               </a:rPr>
-              <a:t>Insights</a:t>
+              <a:t>Comments</a:t>
             </a:r>
           </a:p>
         </p:txBody>
@@ -6822,7 +5607,7 @@
         <p:spPr>
           <a:xfrm>
             <a:off x="4572000" y="1965960"/>
-            <a:ext cx="4114800" cy="3086100"/>
+            <a:ext cx="4114800" cy="3600450"/>
           </a:xfrm>
           <a:prstGeom prst="rect">
             <a:avLst/>
@@ -6837,8 +5622,8 @@
         </p:nvSpPr>
         <p:spPr>
           <a:xfrm>
-            <a:off x="4572000" y="5326380"/>
-            <a:ext cx="4087368" cy="1348739"/>
+            <a:off x="4572000" y="5840730"/>
+            <a:ext cx="4087368" cy="834389"/>
           </a:xfrm>
           <a:prstGeom prst="rect">
             <a:avLst/>
@@ -6882,7 +5667,7 @@
         <p:spPr>
           <a:xfrm>
             <a:off x="8686800" y="1965960"/>
-            <a:ext cx="4114800" cy="3086100"/>
+            <a:ext cx="4114800" cy="3600450"/>
           </a:xfrm>
           <a:prstGeom prst="rect">
             <a:avLst/>
@@ -6897,8 +5682,8 @@
         </p:nvSpPr>
         <p:spPr>
           <a:xfrm>
-            <a:off x="8686800" y="5326380"/>
-            <a:ext cx="4087368" cy="1348739"/>
+            <a:off x="8686800" y="5840730"/>
+            <a:ext cx="4087368" cy="834389"/>
           </a:xfrm>
           <a:prstGeom prst="rect">
             <a:avLst/>
@@ -7048,7 +5833,7 @@
           <a:lstStyle/>
           <a:p>
             <a:r>
-              <a:rPr sz="3600" b="1">
+              <a:rPr sz="2520" b="1">
                 <a:solidFill>
                   <a:srgbClr val="000000"/>
                 </a:solidFill>
@@ -7110,7 +5895,7 @@
         <p:spPr>
           <a:xfrm>
             <a:off x="457200" y="1965960"/>
-            <a:ext cx="4114800" cy="3086100"/>
+            <a:ext cx="4114800" cy="3600450"/>
           </a:xfrm>
           <a:prstGeom prst="rect">
             <a:avLst/>
@@ -7125,8 +5910,8 @@
         </p:nvSpPr>
         <p:spPr>
           <a:xfrm>
-            <a:off x="457200" y="5326380"/>
-            <a:ext cx="4087368" cy="1348739"/>
+            <a:off x="457200" y="5840730"/>
+            <a:ext cx="4087368" cy="834389"/>
           </a:xfrm>
           <a:prstGeom prst="rect">
             <a:avLst/>
@@ -7161,7 +5946,7 @@
         </p:nvSpPr>
         <p:spPr>
           <a:xfrm>
-            <a:off x="457200" y="5052060"/>
+            <a:off x="457200" y="5566410"/>
             <a:ext cx="4087368" cy="274320"/>
           </a:xfrm>
           <a:prstGeom prst="rect">
@@ -7184,7 +5969,7 @@
                 </a:solidFill>
                 <a:latin typeface="Roboto"/>
               </a:rPr>
-              <a:t>Insights</a:t>
+              <a:t>Comments</a:t>
             </a:r>
           </a:p>
         </p:txBody>
@@ -7206,7 +5991,7 @@
         <p:spPr>
           <a:xfrm>
             <a:off x="4572000" y="1965960"/>
-            <a:ext cx="4114800" cy="3086100"/>
+            <a:ext cx="4114800" cy="3600450"/>
           </a:xfrm>
           <a:prstGeom prst="rect">
             <a:avLst/>
@@ -7221,8 +6006,8 @@
         </p:nvSpPr>
         <p:spPr>
           <a:xfrm>
-            <a:off x="4572000" y="5326380"/>
-            <a:ext cx="4087368" cy="1348739"/>
+            <a:off x="4572000" y="5840730"/>
+            <a:ext cx="4087368" cy="834389"/>
           </a:xfrm>
           <a:prstGeom prst="rect">
             <a:avLst/>
@@ -7266,7 +6051,7 @@
         <p:spPr>
           <a:xfrm>
             <a:off x="8686800" y="1965960"/>
-            <a:ext cx="4114800" cy="3086100"/>
+            <a:ext cx="4114800" cy="3600450"/>
           </a:xfrm>
           <a:prstGeom prst="rect">
             <a:avLst/>
@@ -7281,8 +6066,8 @@
         </p:nvSpPr>
         <p:spPr>
           <a:xfrm>
-            <a:off x="8686800" y="5326380"/>
-            <a:ext cx="4087368" cy="1348739"/>
+            <a:off x="8686800" y="5840730"/>
+            <a:ext cx="4087368" cy="834389"/>
           </a:xfrm>
           <a:prstGeom prst="rect">
             <a:avLst/>
@@ -7404,7 +6189,7 @@
                 </a:solidFill>
                 <a:latin typeface="Roboto"/>
               </a:rPr>
-              <a:t>MIXED</a:t>
+              <a:t>SERVICE</a:t>
             </a:r>
           </a:p>
         </p:txBody>
@@ -7432,7 +6217,7 @@
           <a:lstStyle/>
           <a:p>
             <a:r>
-              <a:rPr sz="3600" b="1">
+              <a:rPr sz="2520" b="1">
                 <a:solidFill>
                   <a:srgbClr val="000000"/>
                 </a:solidFill>
@@ -7494,7 +6279,7 @@
         <p:spPr>
           <a:xfrm>
             <a:off x="457200" y="1965960"/>
-            <a:ext cx="4114800" cy="3086100"/>
+            <a:ext cx="4114800" cy="3600450"/>
           </a:xfrm>
           <a:prstGeom prst="rect">
             <a:avLst/>
@@ -7509,8 +6294,8 @@
         </p:nvSpPr>
         <p:spPr>
           <a:xfrm>
-            <a:off x="457200" y="5326380"/>
-            <a:ext cx="4087368" cy="1348739"/>
+            <a:off x="457200" y="5840730"/>
+            <a:ext cx="4087368" cy="834389"/>
           </a:xfrm>
           <a:prstGeom prst="rect">
             <a:avLst/>
@@ -7545,7 +6330,7 @@
         </p:nvSpPr>
         <p:spPr>
           <a:xfrm>
-            <a:off x="457200" y="5052060"/>
+            <a:off x="457200" y="5566410"/>
             <a:ext cx="4087368" cy="274320"/>
           </a:xfrm>
           <a:prstGeom prst="rect">
@@ -7568,7 +6353,7 @@
                 </a:solidFill>
                 <a:latin typeface="Roboto"/>
               </a:rPr>
-              <a:t>Insights</a:t>
+              <a:t>Comments</a:t>
             </a:r>
           </a:p>
         </p:txBody>
@@ -7590,7 +6375,7 @@
         <p:spPr>
           <a:xfrm>
             <a:off x="4572000" y="1965960"/>
-            <a:ext cx="4114800" cy="3086100"/>
+            <a:ext cx="4114800" cy="3600450"/>
           </a:xfrm>
           <a:prstGeom prst="rect">
             <a:avLst/>
@@ -7605,8 +6390,8 @@
         </p:nvSpPr>
         <p:spPr>
           <a:xfrm>
-            <a:off x="4572000" y="5326380"/>
-            <a:ext cx="4087368" cy="1348739"/>
+            <a:off x="4572000" y="5840730"/>
+            <a:ext cx="4087368" cy="834389"/>
           </a:xfrm>
           <a:prstGeom prst="rect">
             <a:avLst/>
@@ -7650,7 +6435,7 @@
         <p:spPr>
           <a:xfrm>
             <a:off x="8686800" y="1965960"/>
-            <a:ext cx="4114800" cy="3086100"/>
+            <a:ext cx="4114800" cy="3600450"/>
           </a:xfrm>
           <a:prstGeom prst="rect">
             <a:avLst/>
@@ -7665,8 +6450,8 @@
         </p:nvSpPr>
         <p:spPr>
           <a:xfrm>
-            <a:off x="8686800" y="5326380"/>
-            <a:ext cx="4087368" cy="1348739"/>
+            <a:off x="8686800" y="5840730"/>
+            <a:ext cx="4087368" cy="834389"/>
           </a:xfrm>
           <a:prstGeom prst="rect">
             <a:avLst/>
@@ -7788,7 +6573,7 @@
                 </a:solidFill>
                 <a:latin typeface="Roboto"/>
               </a:rPr>
-              <a:t>SERVICE</a:t>
+              <a:t>EXPOSURE AND BURN</a:t>
             </a:r>
           </a:p>
         </p:txBody>
@@ -7816,7 +6601,7 @@
           <a:lstStyle/>
           <a:p>
             <a:r>
-              <a:rPr sz="3600" b="1">
+              <a:rPr sz="2520" b="1">
                 <a:solidFill>
                   <a:srgbClr val="000000"/>
                 </a:solidFill>
@@ -7878,7 +6663,7 @@
         <p:spPr>
           <a:xfrm>
             <a:off x="457200" y="1965960"/>
-            <a:ext cx="4114800" cy="3086100"/>
+            <a:ext cx="4114800" cy="3600450"/>
           </a:xfrm>
           <a:prstGeom prst="rect">
             <a:avLst/>
@@ -7893,8 +6678,8 @@
         </p:nvSpPr>
         <p:spPr>
           <a:xfrm>
-            <a:off x="457200" y="5326380"/>
-            <a:ext cx="4087368" cy="1348739"/>
+            <a:off x="457200" y="5840730"/>
+            <a:ext cx="4087368" cy="834389"/>
           </a:xfrm>
           <a:prstGeom prst="rect">
             <a:avLst/>
@@ -7929,7 +6714,7 @@
         </p:nvSpPr>
         <p:spPr>
           <a:xfrm>
-            <a:off x="457200" y="5052060"/>
+            <a:off x="457200" y="5566410"/>
             <a:ext cx="4087368" cy="274320"/>
           </a:xfrm>
           <a:prstGeom prst="rect">
@@ -7952,7 +6737,7 @@
                 </a:solidFill>
                 <a:latin typeface="Roboto"/>
               </a:rPr>
-              <a:t>Insights</a:t>
+              <a:t>Comments</a:t>
             </a:r>
           </a:p>
         </p:txBody>
@@ -7974,7 +6759,7 @@
         <p:spPr>
           <a:xfrm>
             <a:off x="4572000" y="1965960"/>
-            <a:ext cx="4114800" cy="3086100"/>
+            <a:ext cx="4114800" cy="3600450"/>
           </a:xfrm>
           <a:prstGeom prst="rect">
             <a:avLst/>
@@ -7989,8 +6774,8 @@
         </p:nvSpPr>
         <p:spPr>
           <a:xfrm>
-            <a:off x="4572000" y="5326380"/>
-            <a:ext cx="4087368" cy="1348739"/>
+            <a:off x="4572000" y="5840730"/>
+            <a:ext cx="4087368" cy="834389"/>
           </a:xfrm>
           <a:prstGeom prst="rect">
             <a:avLst/>
@@ -8034,7 +6819,7 @@
         <p:spPr>
           <a:xfrm>
             <a:off x="8686800" y="1965960"/>
-            <a:ext cx="4114800" cy="3086100"/>
+            <a:ext cx="4114800" cy="3600450"/>
           </a:xfrm>
           <a:prstGeom prst="rect">
             <a:avLst/>
@@ -8049,8 +6834,8 @@
         </p:nvSpPr>
         <p:spPr>
           <a:xfrm>
-            <a:off x="8686800" y="5326380"/>
-            <a:ext cx="4087368" cy="1348739"/>
+            <a:off x="8686800" y="5840730"/>
+            <a:ext cx="4087368" cy="834389"/>
           </a:xfrm>
           <a:prstGeom prst="rect">
             <a:avLst/>
@@ -8200,7 +6985,7 @@
           <a:lstStyle/>
           <a:p>
             <a:r>
-              <a:rPr sz="3600" b="1">
+              <a:rPr sz="2520" b="1">
                 <a:solidFill>
                   <a:srgbClr val="000000"/>
                 </a:solidFill>
@@ -8262,7 +7047,7 @@
         <p:spPr>
           <a:xfrm>
             <a:off x="457200" y="1965960"/>
-            <a:ext cx="4114800" cy="3086100"/>
+            <a:ext cx="4114800" cy="3600450"/>
           </a:xfrm>
           <a:prstGeom prst="rect">
             <a:avLst/>
@@ -8277,8 +7062,8 @@
         </p:nvSpPr>
         <p:spPr>
           <a:xfrm>
-            <a:off x="457200" y="5326380"/>
-            <a:ext cx="4087368" cy="1348739"/>
+            <a:off x="457200" y="5840730"/>
+            <a:ext cx="4087368" cy="834389"/>
           </a:xfrm>
           <a:prstGeom prst="rect">
             <a:avLst/>
@@ -8313,7 +7098,7 @@
         </p:nvSpPr>
         <p:spPr>
           <a:xfrm>
-            <a:off x="457200" y="5052060"/>
+            <a:off x="457200" y="5566410"/>
             <a:ext cx="4087368" cy="274320"/>
           </a:xfrm>
           <a:prstGeom prst="rect">
@@ -8336,7 +7121,7 @@
                 </a:solidFill>
                 <a:latin typeface="Roboto"/>
               </a:rPr>
-              <a:t>Insights</a:t>
+              <a:t>Comments</a:t>
             </a:r>
           </a:p>
         </p:txBody>
@@ -8358,7 +7143,7 @@
         <p:spPr>
           <a:xfrm>
             <a:off x="4572000" y="1965960"/>
-            <a:ext cx="4114800" cy="3086100"/>
+            <a:ext cx="4114800" cy="3600450"/>
           </a:xfrm>
           <a:prstGeom prst="rect">
             <a:avLst/>
@@ -8373,8 +7158,8 @@
         </p:nvSpPr>
         <p:spPr>
           <a:xfrm>
-            <a:off x="4572000" y="5326380"/>
-            <a:ext cx="4087368" cy="1348739"/>
+            <a:off x="4572000" y="5840730"/>
+            <a:ext cx="4087368" cy="834389"/>
           </a:xfrm>
           <a:prstGeom prst="rect">
             <a:avLst/>
@@ -8418,7 +7203,7 @@
         <p:spPr>
           <a:xfrm>
             <a:off x="8686800" y="1965960"/>
-            <a:ext cx="4114800" cy="3086100"/>
+            <a:ext cx="4114800" cy="3600450"/>
           </a:xfrm>
           <a:prstGeom prst="rect">
             <a:avLst/>
@@ -8433,8 +7218,8 @@
         </p:nvSpPr>
         <p:spPr>
           <a:xfrm>
-            <a:off x="8686800" y="5326380"/>
-            <a:ext cx="4087368" cy="1348739"/>
+            <a:off x="8686800" y="5840730"/>
+            <a:ext cx="4087368" cy="834389"/>
           </a:xfrm>
           <a:prstGeom prst="rect">
             <a:avLst/>
@@ -8556,7 +7341,7 @@
                 </a:solidFill>
                 <a:latin typeface="Roboto"/>
               </a:rPr>
-              <a:t>MIXED</a:t>
+              <a:t>SERVICE</a:t>
             </a:r>
           </a:p>
         </p:txBody>
@@ -8584,7 +7369,7 @@
           <a:lstStyle/>
           <a:p>
             <a:r>
-              <a:rPr sz="3600" b="1">
+              <a:rPr sz="2520" b="1">
                 <a:solidFill>
                   <a:srgbClr val="000000"/>
                 </a:solidFill>
@@ -8646,7 +7431,7 @@
         <p:spPr>
           <a:xfrm>
             <a:off x="457200" y="1965960"/>
-            <a:ext cx="4114800" cy="3086100"/>
+            <a:ext cx="4114800" cy="3600450"/>
           </a:xfrm>
           <a:prstGeom prst="rect">
             <a:avLst/>
@@ -8661,8 +7446,8 @@
         </p:nvSpPr>
         <p:spPr>
           <a:xfrm>
-            <a:off x="457200" y="5326380"/>
-            <a:ext cx="4087368" cy="1348739"/>
+            <a:off x="457200" y="5840730"/>
+            <a:ext cx="4087368" cy="834389"/>
           </a:xfrm>
           <a:prstGeom prst="rect">
             <a:avLst/>
@@ -8697,7 +7482,7 @@
         </p:nvSpPr>
         <p:spPr>
           <a:xfrm>
-            <a:off x="457200" y="5052060"/>
+            <a:off x="457200" y="5566410"/>
             <a:ext cx="4087368" cy="274320"/>
           </a:xfrm>
           <a:prstGeom prst="rect">
@@ -8720,7 +7505,7 @@
                 </a:solidFill>
                 <a:latin typeface="Roboto"/>
               </a:rPr>
-              <a:t>Insights</a:t>
+              <a:t>Comments</a:t>
             </a:r>
           </a:p>
         </p:txBody>
@@ -8742,7 +7527,7 @@
         <p:spPr>
           <a:xfrm>
             <a:off x="4572000" y="1965960"/>
-            <a:ext cx="4114800" cy="3086100"/>
+            <a:ext cx="4114800" cy="3600450"/>
           </a:xfrm>
           <a:prstGeom prst="rect">
             <a:avLst/>
@@ -8757,8 +7542,8 @@
         </p:nvSpPr>
         <p:spPr>
           <a:xfrm>
-            <a:off x="4572000" y="5326380"/>
-            <a:ext cx="4087368" cy="1348739"/>
+            <a:off x="4572000" y="5840730"/>
+            <a:ext cx="4087368" cy="834389"/>
           </a:xfrm>
           <a:prstGeom prst="rect">
             <a:avLst/>
@@ -8802,7 +7587,7 @@
         <p:spPr>
           <a:xfrm>
             <a:off x="8686800" y="1965960"/>
-            <a:ext cx="4114800" cy="3086100"/>
+            <a:ext cx="4114800" cy="3600450"/>
           </a:xfrm>
           <a:prstGeom prst="rect">
             <a:avLst/>
@@ -8817,8 +7602,8 @@
         </p:nvSpPr>
         <p:spPr>
           <a:xfrm>
-            <a:off x="8686800" y="5326380"/>
-            <a:ext cx="4087368" cy="1348739"/>
+            <a:off x="8686800" y="5840730"/>
+            <a:ext cx="4087368" cy="834389"/>
           </a:xfrm>
           <a:prstGeom prst="rect">
             <a:avLst/>
@@ -8940,7 +7725,7 @@
                 </a:solidFill>
                 <a:latin typeface="Roboto"/>
               </a:rPr>
-              <a:t>SERVICE</a:t>
+              <a:t>EXPOSURE AND BURN</a:t>
             </a:r>
           </a:p>
         </p:txBody>
@@ -8968,7 +7753,7 @@
           <a:lstStyle/>
           <a:p>
             <a:r>
-              <a:rPr sz="3600" b="1">
+              <a:rPr sz="2520" b="1">
                 <a:solidFill>
                   <a:srgbClr val="000000"/>
                 </a:solidFill>
@@ -9030,7 +7815,7 @@
         <p:spPr>
           <a:xfrm>
             <a:off x="457200" y="1965960"/>
-            <a:ext cx="4114800" cy="3086100"/>
+            <a:ext cx="4114800" cy="3600450"/>
           </a:xfrm>
           <a:prstGeom prst="rect">
             <a:avLst/>
@@ -9045,8 +7830,8 @@
         </p:nvSpPr>
         <p:spPr>
           <a:xfrm>
-            <a:off x="457200" y="5326380"/>
-            <a:ext cx="4087368" cy="1348739"/>
+            <a:off x="457200" y="5840730"/>
+            <a:ext cx="4087368" cy="834389"/>
           </a:xfrm>
           <a:prstGeom prst="rect">
             <a:avLst/>
@@ -9081,7 +7866,7 @@
         </p:nvSpPr>
         <p:spPr>
           <a:xfrm>
-            <a:off x="457200" y="5052060"/>
+            <a:off x="457200" y="5566410"/>
             <a:ext cx="4087368" cy="274320"/>
           </a:xfrm>
           <a:prstGeom prst="rect">
@@ -9104,7 +7889,7 @@
                 </a:solidFill>
                 <a:latin typeface="Roboto"/>
               </a:rPr>
-              <a:t>Insights</a:t>
+              <a:t>Comments</a:t>
             </a:r>
           </a:p>
         </p:txBody>
@@ -9126,7 +7911,7 @@
         <p:spPr>
           <a:xfrm>
             <a:off x="4572000" y="1965960"/>
-            <a:ext cx="4114800" cy="3086100"/>
+            <a:ext cx="4114800" cy="3600450"/>
           </a:xfrm>
           <a:prstGeom prst="rect">
             <a:avLst/>
@@ -9141,8 +7926,8 @@
         </p:nvSpPr>
         <p:spPr>
           <a:xfrm>
-            <a:off x="4572000" y="5326380"/>
-            <a:ext cx="4087368" cy="1348739"/>
+            <a:off x="4572000" y="5840730"/>
+            <a:ext cx="4087368" cy="834389"/>
           </a:xfrm>
           <a:prstGeom prst="rect">
             <a:avLst/>
@@ -9186,7 +7971,7 @@
         <p:spPr>
           <a:xfrm>
             <a:off x="8686800" y="1965960"/>
-            <a:ext cx="4114800" cy="3086100"/>
+            <a:ext cx="4114800" cy="3600450"/>
           </a:xfrm>
           <a:prstGeom prst="rect">
             <a:avLst/>
@@ -9201,8 +7986,8 @@
         </p:nvSpPr>
         <p:spPr>
           <a:xfrm>
-            <a:off x="8686800" y="5326380"/>
-            <a:ext cx="4087368" cy="1348739"/>
+            <a:off x="8686800" y="5840730"/>
+            <a:ext cx="4087368" cy="834389"/>
           </a:xfrm>
           <a:prstGeom prst="rect">
             <a:avLst/>

</xml_diff>

<commit_message>
yo la verdad no se
</commit_message>
<xml_diff>
--- a/pptx_presentations/plots/MX_plots.pptx
+++ b/pptx_presentations/plots/MX_plots.pptx
@@ -4253,7 +4253,7 @@
                 </a:solidFill>
                 <a:latin typeface="Roboto"/>
               </a:rPr>
-              <a:t>Eff online rs average in the last 4 months: 7,646.80 and the percentage change between the last 2 months: -0.05%.</a:t>
+              <a:t>Overdue orders per total orders average in the last 4 months: 13.47 % and the percentage change between the last 2 months: -5.88%.</a:t>
             </a:r>
           </a:p>
           <a:p>
@@ -4264,7 +4264,7 @@
                 </a:solidFill>
                 <a:latin typeface="Roboto"/>
               </a:rPr>
-              <a:t>Healthy stores average in the last 4 months: 6,442.59 and the percentage change between the last 2 months: 0.46%.</a:t>
+              <a:t>B cancel rate average in the last 4 months: 2.86 % and the percentage change between the last 2 months: -0.85%.</a:t>
             </a:r>
           </a:p>
           <a:p/>
@@ -4732,7 +4732,7 @@
                 </a:solidFill>
                 <a:latin typeface="Roboto"/>
               </a:rPr>
-              <a:t>Co-Subsidized Orders: 202</a:t>
+              <a:t>Co-Subsidized Orders: 202 orders</a:t>
             </a:r>
           </a:p>
           <a:p>
@@ -4743,7 +4743,7 @@
                 </a:solidFill>
                 <a:latin typeface="Roboto"/>
               </a:rPr>
-              <a:t>R burn: 9,913</a:t>
+              <a:t>R burn: 9,913 orders</a:t>
             </a:r>
           </a:p>
           <a:p>
@@ -4754,7 +4754,7 @@
                 </a:solidFill>
                 <a:latin typeface="Roboto"/>
               </a:rPr>
-              <a:t>Others: 3,164</a:t>
+              <a:t>Others: 3,164 orders</a:t>
             </a:r>
           </a:p>
           <a:p>
@@ -4765,7 +4765,7 @@
                 </a:solidFill>
                 <a:latin typeface="Roboto"/>
               </a:rPr>
-              <a:t>Organic: 6,903</a:t>
+              <a:t>Organic: 6,903 orders</a:t>
             </a:r>
           </a:p>
           <a:p/>
@@ -5448,7 +5448,7 @@
                 </a:solidFill>
                 <a:latin typeface="Roboto"/>
               </a:rPr>
-              <a:t>Eff online rs average in the last 4 months: 3,457.60 and the percentage change between the last 2 months: 16.22%.</a:t>
+              <a:t>Overdue orders per total orders average in the last 4 months: 14.28 % and the percentage change between the last 2 months: -6.57%.</a:t>
             </a:r>
           </a:p>
           <a:p>
@@ -5459,7 +5459,7 @@
                 </a:solidFill>
                 <a:latin typeface="Roboto"/>
               </a:rPr>
-              <a:t>Healthy stores average in the last 4 months: 3,193.43 and the percentage change between the last 2 months: 16.1%.</a:t>
+              <a:t>B cancel rate average in the last 4 months: 0.85 % and the percentage change between the last 2 months: 4.82%.</a:t>
             </a:r>
           </a:p>
           <a:p/>
@@ -5927,7 +5927,7 @@
                 </a:solidFill>
                 <a:latin typeface="Roboto"/>
               </a:rPr>
-              <a:t>Co-Subsidized Orders: 28,360</a:t>
+              <a:t>Co-Subsidized Orders: 28,360 orders</a:t>
             </a:r>
           </a:p>
           <a:p>
@@ -5938,7 +5938,7 @@
                 </a:solidFill>
                 <a:latin typeface="Roboto"/>
               </a:rPr>
-              <a:t>R burn: 17,782</a:t>
+              <a:t>R burn: 17,782 orders</a:t>
             </a:r>
           </a:p>
           <a:p>
@@ -5949,7 +5949,7 @@
                 </a:solidFill>
                 <a:latin typeface="Roboto"/>
               </a:rPr>
-              <a:t>Others: 3,313</a:t>
+              <a:t>Others: 3,313 orders</a:t>
             </a:r>
           </a:p>
           <a:p>
@@ -5960,7 +5960,7 @@
                 </a:solidFill>
                 <a:latin typeface="Roboto"/>
               </a:rPr>
-              <a:t>Organic: 7,490</a:t>
+              <a:t>Organic: 7,490 orders</a:t>
             </a:r>
           </a:p>
           <a:p/>
@@ -6717,7 +6717,7 @@
                 </a:solidFill>
                 <a:latin typeface="Roboto"/>
               </a:rPr>
-              <a:t>Eff online rs average in the last 4 months: 4,141.60 and the percentage change between the last 2 months: 4.09%.</a:t>
+              <a:t>Overdue orders per total orders average in the last 4 months: 13.79 % and the percentage change between the last 2 months: -5.6%.</a:t>
             </a:r>
           </a:p>
           <a:p>
@@ -6728,7 +6728,7 @@
                 </a:solidFill>
                 <a:latin typeface="Roboto"/>
               </a:rPr>
-              <a:t>Healthy stores average in the last 4 months: 3,569.89 and the percentage change between the last 2 months: 4.15%.</a:t>
+              <a:t>B cancel rate average in the last 4 months: 2.21 % and the percentage change between the last 2 months: -8.91%.</a:t>
             </a:r>
           </a:p>
           <a:p/>
@@ -7196,7 +7196,7 @@
                 </a:solidFill>
                 <a:latin typeface="Roboto"/>
               </a:rPr>
-              <a:t>Co-Subsidized Orders: 11,466</a:t>
+              <a:t>Co-Subsidized Orders: 11,466 orders</a:t>
             </a:r>
           </a:p>
           <a:p>
@@ -7207,7 +7207,7 @@
                 </a:solidFill>
                 <a:latin typeface="Roboto"/>
               </a:rPr>
-              <a:t>R burn: 7,927</a:t>
+              <a:t>R burn: 7,927 orders</a:t>
             </a:r>
           </a:p>
           <a:p>
@@ -7218,7 +7218,7 @@
                 </a:solidFill>
                 <a:latin typeface="Roboto"/>
               </a:rPr>
-              <a:t>Others: 1,960</a:t>
+              <a:t>Others: 1,960 orders</a:t>
             </a:r>
           </a:p>
           <a:p>
@@ -7229,7 +7229,7 @@
                 </a:solidFill>
                 <a:latin typeface="Roboto"/>
               </a:rPr>
-              <a:t>Organic: 4,142</a:t>
+              <a:t>Organic: 4,142 orders</a:t>
             </a:r>
           </a:p>
           <a:p/>
@@ -7986,7 +7986,7 @@
                 </a:solidFill>
                 <a:latin typeface="Roboto"/>
               </a:rPr>
-              <a:t>Eff online rs average in the last 4 months: 1,370.40 and the percentage change between the last 2 months: 11.73%.</a:t>
+              <a:t>Overdue orders per total orders average in the last 4 months: 18.84 % and the percentage change between the last 2 months: 11.97%.</a:t>
             </a:r>
           </a:p>
           <a:p>
@@ -7997,7 +7997,7 @@
                 </a:solidFill>
                 <a:latin typeface="Roboto"/>
               </a:rPr>
-              <a:t>Healthy stores average in the last 4 months: 1,157.09 and the percentage change between the last 2 months: 12.12%.</a:t>
+              <a:t>B cancel rate average in the last 4 months: 4.33 % and the percentage change between the last 2 months: 18.59%.</a:t>
             </a:r>
           </a:p>
           <a:p/>
@@ -8465,7 +8465,7 @@
                 </a:solidFill>
                 <a:latin typeface="Roboto"/>
               </a:rPr>
-              <a:t>Co-Subsidized Orders: 813</a:t>
+              <a:t>Co-Subsidized Orders: 813 orders</a:t>
             </a:r>
           </a:p>
           <a:p>
@@ -8476,7 +8476,7 @@
                 </a:solidFill>
                 <a:latin typeface="Roboto"/>
               </a:rPr>
-              <a:t>R burn: 667</a:t>
+              <a:t>R burn: 667 orders</a:t>
             </a:r>
           </a:p>
           <a:p>
@@ -8487,7 +8487,7 @@
                 </a:solidFill>
                 <a:latin typeface="Roboto"/>
               </a:rPr>
-              <a:t>Others: 150</a:t>
+              <a:t>Others: 150 orders</a:t>
             </a:r>
           </a:p>
           <a:p>
@@ -8498,7 +8498,7 @@
                 </a:solidFill>
                 <a:latin typeface="Roboto"/>
               </a:rPr>
-              <a:t>Organic: 322</a:t>
+              <a:t>Organic: 322 orders</a:t>
             </a:r>
           </a:p>
           <a:p/>

</xml_diff>